<commit_message>
add countable.pptx, tweak cantor, cardinality
</commit_message>
<xml_diff>
--- a/spring15/slidesS15/cantor.pptx
+++ b/spring15/slidesS15/cantor.pptx
@@ -6103,7 +6103,7 @@
           <a:graphicData uri="http://schemas.openxmlformats.org/presentationml/2006/ole">
             <mc:AlternateContent xmlns:mc="http://schemas.openxmlformats.org/markup-compatibility/2006">
               <mc:Choice xmlns:v="urn:schemas-microsoft-com:vml" Requires="v">
-                <p:oleObj spid="_x0000_s90136" name="Equation" r:id="rId4" imgW="1587500" imgH="215900" progId="Equation.DSMT4">
+                <p:oleObj spid="_x0000_s90143" name="Equation" r:id="rId4" imgW="1587500" imgH="215900" progId="Equation.DSMT4">
                   <p:embed/>
                 </p:oleObj>
               </mc:Choice>
@@ -7616,7 +7616,7 @@
           <a:graphicData uri="http://schemas.openxmlformats.org/presentationml/2006/ole">
             <mc:AlternateContent xmlns:mc="http://schemas.openxmlformats.org/markup-compatibility/2006">
               <mc:Choice xmlns:v="urn:schemas-microsoft-com:vml" Requires="v">
-                <p:oleObj spid="_x0000_s90137" name="Equation" r:id="rId6" imgW="2463800" imgH="228600" progId="Equation.DSMT4">
+                <p:oleObj spid="_x0000_s90144" name="Equation" r:id="rId6" imgW="2463800" imgH="228600" progId="Equation.DSMT4">
                   <p:embed/>
                 </p:oleObj>
               </mc:Choice>
@@ -8001,7 +8001,7 @@
           <a:graphicData uri="http://schemas.openxmlformats.org/presentationml/2006/ole">
             <mc:AlternateContent xmlns:mc="http://schemas.openxmlformats.org/markup-compatibility/2006">
               <mc:Choice xmlns:v="urn:schemas-microsoft-com:vml" Requires="v">
-                <p:oleObj spid="_x0000_s91162" name="Equation" r:id="rId4" imgW="1587500" imgH="215900" progId="Equation.DSMT4">
+                <p:oleObj spid="_x0000_s91169" name="Equation" r:id="rId4" imgW="1587500" imgH="215900" progId="Equation.DSMT4">
                   <p:embed/>
                 </p:oleObj>
               </mc:Choice>
@@ -9977,7 +9977,7 @@
           <a:graphicData uri="http://schemas.openxmlformats.org/presentationml/2006/ole">
             <mc:AlternateContent xmlns:mc="http://schemas.openxmlformats.org/markup-compatibility/2006">
               <mc:Choice xmlns:v="urn:schemas-microsoft-com:vml" Requires="v">
-                <p:oleObj spid="_x0000_s91163" name="Equation" r:id="rId6" imgW="2463800" imgH="228600" progId="Equation.DSMT4">
+                <p:oleObj spid="_x0000_s91170" name="Equation" r:id="rId6" imgW="2463800" imgH="228600" progId="Equation.DSMT4">
                   <p:embed/>
                 </p:oleObj>
               </mc:Choice>
@@ -10137,7 +10137,7 @@
           <a:graphicData uri="http://schemas.openxmlformats.org/presentationml/2006/ole">
             <mc:AlternateContent xmlns:mc="http://schemas.openxmlformats.org/markup-compatibility/2006">
               <mc:Choice xmlns:v="urn:schemas-microsoft-com:vml" Requires="v">
-                <p:oleObj spid="_x0000_s92180" name="Equation" r:id="rId4" imgW="1587500" imgH="215900" progId="Equation.DSMT4">
+                <p:oleObj spid="_x0000_s92187" name="Equation" r:id="rId4" imgW="1587500" imgH="215900" progId="Equation.DSMT4">
                   <p:embed/>
                 </p:oleObj>
               </mc:Choice>
@@ -12208,7 +12208,7 @@
           <a:graphicData uri="http://schemas.openxmlformats.org/presentationml/2006/ole">
             <mc:AlternateContent xmlns:mc="http://schemas.openxmlformats.org/markup-compatibility/2006">
               <mc:Choice xmlns:v="urn:schemas-microsoft-com:vml" Requires="v">
-                <p:oleObj spid="_x0000_s92181" name="Equation" r:id="rId6" imgW="2463800" imgH="228600" progId="Equation.DSMT4">
+                <p:oleObj spid="_x0000_s92188" name="Equation" r:id="rId6" imgW="2463800" imgH="228600" progId="Equation.DSMT4">
                   <p:embed/>
                 </p:oleObj>
               </mc:Choice>
@@ -12473,7 +12473,7 @@
           <a:graphicData uri="http://schemas.openxmlformats.org/presentationml/2006/ole">
             <mc:AlternateContent xmlns:mc="http://schemas.openxmlformats.org/markup-compatibility/2006">
               <mc:Choice xmlns:v="urn:schemas-microsoft-com:vml" Requires="v">
-                <p:oleObj spid="_x0000_s93204" name="Equation" r:id="rId4" imgW="1587500" imgH="215900" progId="Equation.DSMT4">
+                <p:oleObj spid="_x0000_s93211" name="Equation" r:id="rId4" imgW="1587500" imgH="215900" progId="Equation.DSMT4">
                   <p:embed/>
                 </p:oleObj>
               </mc:Choice>
@@ -14528,7 +14528,7 @@
           <a:graphicData uri="http://schemas.openxmlformats.org/presentationml/2006/ole">
             <mc:AlternateContent xmlns:mc="http://schemas.openxmlformats.org/markup-compatibility/2006">
               <mc:Choice xmlns:v="urn:schemas-microsoft-com:vml" Requires="v">
-                <p:oleObj spid="_x0000_s93205" name="Equation" r:id="rId6" imgW="2463800" imgH="228600" progId="Equation.DSMT4">
+                <p:oleObj spid="_x0000_s93212" name="Equation" r:id="rId6" imgW="2463800" imgH="228600" progId="Equation.DSMT4">
                   <p:embed/>
                 </p:oleObj>
               </mc:Choice>
@@ -15046,7 +15046,7 @@
           <a:graphicData uri="http://schemas.openxmlformats.org/presentationml/2006/ole">
             <mc:AlternateContent xmlns:mc="http://schemas.openxmlformats.org/markup-compatibility/2006">
               <mc:Choice xmlns:v="urn:schemas-microsoft-com:vml" Requires="v">
-                <p:oleObj spid="_x0000_s79931" name="Equation" r:id="rId5" imgW="889000" imgH="228600" progId="Equation.DSMT4">
+                <p:oleObj spid="_x0000_s79935" name="Equation" r:id="rId5" imgW="889000" imgH="228600" progId="Equation.DSMT4">
                   <p:embed/>
                 </p:oleObj>
               </mc:Choice>
@@ -15174,7 +15174,7 @@
                             </p:stCondLst>
                             <p:childTnLst>
                               <p:par>
-                                <p:cTn id="5" presetID="10" presetClass="entr" presetSubtype="0" fill="hold" grpId="0" nodeType="clickEffect">
+                                <p:cTn id="5" presetID="9" presetClass="entr" presetSubtype="0" fill="hold" grpId="0" nodeType="clickEffect">
                                   <p:stCondLst>
                                     <p:cond delay="0"/>
                                   </p:stCondLst>
@@ -15182,59 +15182,6 @@
                                     <p:set>
                                       <p:cBhvr>
                                         <p:cTn id="6" dur="1" fill="hold">
-                                          <p:stCondLst>
-                                            <p:cond delay="0"/>
-                                          </p:stCondLst>
-                                        </p:cTn>
-                                        <p:tgtEl>
-                                          <p:spTgt spid="5"/>
-                                        </p:tgtEl>
-                                        <p:attrNameLst>
-                                          <p:attrName>style.visibility</p:attrName>
-                                        </p:attrNameLst>
-                                      </p:cBhvr>
-                                      <p:to>
-                                        <p:strVal val="visible"/>
-                                      </p:to>
-                                    </p:set>
-                                    <p:animEffect transition="in" filter="fade">
-                                      <p:cBhvr>
-                                        <p:cTn id="7" dur="500"/>
-                                        <p:tgtEl>
-                                          <p:spTgt spid="5"/>
-                                        </p:tgtEl>
-                                      </p:cBhvr>
-                                    </p:animEffect>
-                                  </p:childTnLst>
-                                </p:cTn>
-                              </p:par>
-                            </p:childTnLst>
-                          </p:cTn>
-                        </p:par>
-                      </p:childTnLst>
-                    </p:cTn>
-                  </p:par>
-                  <p:par>
-                    <p:cTn id="8" fill="hold">
-                      <p:stCondLst>
-                        <p:cond delay="indefinite"/>
-                      </p:stCondLst>
-                      <p:childTnLst>
-                        <p:par>
-                          <p:cTn id="9" fill="hold">
-                            <p:stCondLst>
-                              <p:cond delay="0"/>
-                            </p:stCondLst>
-                            <p:childTnLst>
-                              <p:par>
-                                <p:cTn id="10" presetID="9" presetClass="entr" presetSubtype="0" fill="hold" grpId="0" nodeType="clickEffect">
-                                  <p:stCondLst>
-                                    <p:cond delay="0"/>
-                                  </p:stCondLst>
-                                  <p:childTnLst>
-                                    <p:set>
-                                      <p:cBhvr>
-                                        <p:cTn id="11" dur="1" fill="hold">
                                           <p:stCondLst>
                                             <p:cond delay="0"/>
                                           </p:stCondLst>
@@ -15256,7 +15203,7 @@
                                     </p:set>
                                     <p:animEffect transition="in" filter="dissolve">
                                       <p:cBhvr>
-                                        <p:cTn id="12" dur="500"/>
+                                        <p:cTn id="7" dur="500"/>
                                         <p:tgtEl>
                                           <p:spTgt spid="3">
                                             <p:txEl>
@@ -15270,14 +15217,14 @@
                                 </p:cTn>
                               </p:par>
                               <p:par>
-                                <p:cTn id="13" presetID="9" presetClass="entr" presetSubtype="0" fill="hold" grpId="0" nodeType="withEffect">
+                                <p:cTn id="8" presetID="9" presetClass="entr" presetSubtype="0" fill="hold" grpId="0" nodeType="withEffect">
                                   <p:stCondLst>
                                     <p:cond delay="0"/>
                                   </p:stCondLst>
                                   <p:childTnLst>
                                     <p:set>
                                       <p:cBhvr>
-                                        <p:cTn id="14" dur="1" fill="hold">
+                                        <p:cTn id="9" dur="1" fill="hold">
                                           <p:stCondLst>
                                             <p:cond delay="0"/>
                                           </p:stCondLst>
@@ -15299,11 +15246,72 @@
                                     </p:set>
                                     <p:animEffect transition="in" filter="dissolve">
                                       <p:cBhvr>
+                                        <p:cTn id="10" dur="500"/>
+                                        <p:tgtEl>
+                                          <p:spTgt spid="3">
+                                            <p:txEl>
+                                              <p:pRg st="1" end="1"/>
+                                            </p:txEl>
+                                          </p:spTgt>
+                                        </p:tgtEl>
+                                      </p:cBhvr>
+                                    </p:animEffect>
+                                  </p:childTnLst>
+                                </p:cTn>
+                              </p:par>
+                            </p:childTnLst>
+                          </p:cTn>
+                        </p:par>
+                      </p:childTnLst>
+                    </p:cTn>
+                  </p:par>
+                  <p:par>
+                    <p:cTn id="11" fill="hold">
+                      <p:stCondLst>
+                        <p:cond delay="indefinite"/>
+                      </p:stCondLst>
+                      <p:childTnLst>
+                        <p:par>
+                          <p:cTn id="12" fill="hold">
+                            <p:stCondLst>
+                              <p:cond delay="0"/>
+                            </p:stCondLst>
+                            <p:childTnLst>
+                              <p:par>
+                                <p:cTn id="13" presetID="22" presetClass="entr" presetSubtype="8" fill="hold" grpId="0" nodeType="clickEffect">
+                                  <p:stCondLst>
+                                    <p:cond delay="0"/>
+                                  </p:stCondLst>
+                                  <p:childTnLst>
+                                    <p:set>
+                                      <p:cBhvr>
+                                        <p:cTn id="14" dur="1" fill="hold">
+                                          <p:stCondLst>
+                                            <p:cond delay="0"/>
+                                          </p:stCondLst>
+                                        </p:cTn>
+                                        <p:tgtEl>
+                                          <p:spTgt spid="3">
+                                            <p:txEl>
+                                              <p:pRg st="2" end="2"/>
+                                            </p:txEl>
+                                          </p:spTgt>
+                                        </p:tgtEl>
+                                        <p:attrNameLst>
+                                          <p:attrName>style.visibility</p:attrName>
+                                        </p:attrNameLst>
+                                      </p:cBhvr>
+                                      <p:to>
+                                        <p:strVal val="visible"/>
+                                      </p:to>
+                                    </p:set>
+                                    <p:animEffect transition="in" filter="wipe(left)">
+                                      <p:cBhvr>
                                         <p:cTn id="15" dur="500"/>
                                         <p:tgtEl>
                                           <p:spTgt spid="3">
                                             <p:txEl>
-                                              <p:pRg st="1" end="1"/>
+                                              <p:pRg st="2" end="2"/>
                                             </p:txEl>
                                           </p:spTgt>
                                         </p:tgtEl>
@@ -15331,7 +15339,7 @@
                             </p:stCondLst>
                             <p:childTnLst>
                               <p:par>
-                                <p:cTn id="18" presetID="22" presetClass="entr" presetSubtype="8" fill="hold" grpId="0" nodeType="clickEffect">
+                                <p:cTn id="18" presetID="9" presetClass="entr" presetSubtype="0" fill="hold" grpId="0" nodeType="clickEffect">
                                   <p:stCondLst>
                                     <p:cond delay="0"/>
                                   </p:stCondLst>
@@ -15339,67 +15347,6 @@
                                     <p:set>
                                       <p:cBhvr>
                                         <p:cTn id="19" dur="1" fill="hold">
-                                          <p:stCondLst>
-                                            <p:cond delay="0"/>
-                                          </p:stCondLst>
-                                        </p:cTn>
-                                        <p:tgtEl>
-                                          <p:spTgt spid="3">
-                                            <p:txEl>
-                                              <p:pRg st="2" end="2"/>
-                                            </p:txEl>
-                                          </p:spTgt>
-                                        </p:tgtEl>
-                                        <p:attrNameLst>
-                                          <p:attrName>style.visibility</p:attrName>
-                                        </p:attrNameLst>
-                                      </p:cBhvr>
-                                      <p:to>
-                                        <p:strVal val="visible"/>
-                                      </p:to>
-                                    </p:set>
-                                    <p:animEffect transition="in" filter="wipe(left)">
-                                      <p:cBhvr>
-                                        <p:cTn id="20" dur="500"/>
-                                        <p:tgtEl>
-                                          <p:spTgt spid="3">
-                                            <p:txEl>
-                                              <p:pRg st="2" end="2"/>
-                                            </p:txEl>
-                                          </p:spTgt>
-                                        </p:tgtEl>
-                                      </p:cBhvr>
-                                    </p:animEffect>
-                                  </p:childTnLst>
-                                </p:cTn>
-                              </p:par>
-                            </p:childTnLst>
-                          </p:cTn>
-                        </p:par>
-                      </p:childTnLst>
-                    </p:cTn>
-                  </p:par>
-                  <p:par>
-                    <p:cTn id="21" fill="hold">
-                      <p:stCondLst>
-                        <p:cond delay="indefinite"/>
-                      </p:stCondLst>
-                      <p:childTnLst>
-                        <p:par>
-                          <p:cTn id="22" fill="hold">
-                            <p:stCondLst>
-                              <p:cond delay="0"/>
-                            </p:stCondLst>
-                            <p:childTnLst>
-                              <p:par>
-                                <p:cTn id="23" presetID="9" presetClass="entr" presetSubtype="0" fill="hold" grpId="0" nodeType="clickEffect">
-                                  <p:stCondLst>
-                                    <p:cond delay="0"/>
-                                  </p:stCondLst>
-                                  <p:childTnLst>
-                                    <p:set>
-                                      <p:cBhvr>
-                                        <p:cTn id="24" dur="1" fill="hold">
                                           <p:stCondLst>
                                             <p:cond delay="0"/>
                                           </p:stCondLst>
@@ -15421,7 +15368,7 @@
                                     </p:set>
                                     <p:animEffect transition="in" filter="dissolve">
                                       <p:cBhvr>
-                                        <p:cTn id="25" dur="500"/>
+                                        <p:cTn id="20" dur="500"/>
                                         <p:tgtEl>
                                           <p:spTgt spid="3">
                                             <p:txEl>
@@ -15435,14 +15382,14 @@
                                 </p:cTn>
                               </p:par>
                               <p:par>
-                                <p:cTn id="26" presetID="9" presetClass="entr" presetSubtype="0" fill="hold" nodeType="withEffect">
+                                <p:cTn id="21" presetID="9" presetClass="entr" presetSubtype="0" fill="hold" nodeType="withEffect">
                                   <p:stCondLst>
                                     <p:cond delay="0"/>
                                   </p:stCondLst>
                                   <p:childTnLst>
                                     <p:set>
                                       <p:cBhvr>
-                                        <p:cTn id="27" dur="1" fill="hold">
+                                        <p:cTn id="22" dur="1" fill="hold">
                                           <p:stCondLst>
                                             <p:cond delay="0"/>
                                           </p:stCondLst>
@@ -15460,7 +15407,7 @@
                                     </p:set>
                                     <p:animEffect transition="in" filter="dissolve">
                                       <p:cBhvr>
-                                        <p:cTn id="28" dur="500"/>
+                                        <p:cTn id="23" dur="500"/>
                                         <p:tgtEl>
                                           <p:spTgt spid="4"/>
                                         </p:tgtEl>
@@ -15470,14 +15417,14 @@
                                 </p:cTn>
                               </p:par>
                               <p:par>
-                                <p:cTn id="29" presetID="9" presetClass="entr" presetSubtype="0" fill="hold" grpId="0" nodeType="withEffect">
+                                <p:cTn id="24" presetID="9" presetClass="entr" presetSubtype="0" fill="hold" grpId="0" nodeType="withEffect">
                                   <p:stCondLst>
                                     <p:cond delay="0"/>
                                   </p:stCondLst>
                                   <p:childTnLst>
                                     <p:set>
                                       <p:cBhvr>
-                                        <p:cTn id="30" dur="1" fill="hold">
+                                        <p:cTn id="25" dur="1" fill="hold">
                                           <p:stCondLst>
                                             <p:cond delay="0"/>
                                           </p:stCondLst>
@@ -15499,7 +15446,7 @@
                                     </p:set>
                                     <p:animEffect transition="in" filter="dissolve">
                                       <p:cBhvr>
-                                        <p:cTn id="31" dur="500"/>
+                                        <p:cTn id="26" dur="500"/>
                                         <p:tgtEl>
                                           <p:spTgt spid="3">
                                             <p:txEl>
@@ -15541,7 +15488,6 @@
     </p:tnLst>
     <p:bldLst>
       <p:bldP spid="3" grpId="0" build="p"/>
-      <p:bldP spid="5" grpId="0"/>
     </p:bldLst>
   </p:timing>
 </p:sld>
@@ -19726,7 +19672,7 @@
           <a:graphicData uri="http://schemas.openxmlformats.org/presentationml/2006/ole">
             <mc:AlternateContent xmlns:mc="http://schemas.openxmlformats.org/markup-compatibility/2006">
               <mc:Choice xmlns:v="urn:schemas-microsoft-com:vml" Requires="v">
-                <p:oleObj spid="_x0000_s94230" name="Equation" r:id="rId3" imgW="546100" imgH="228600" progId="Equation.DSMT4">
+                <p:oleObj spid="_x0000_s94237" name="Equation" r:id="rId3" imgW="546100" imgH="228600" progId="Equation.DSMT4">
                   <p:embed/>
                 </p:oleObj>
               </mc:Choice>
@@ -19832,7 +19778,7 @@
           <a:graphicData uri="http://schemas.openxmlformats.org/presentationml/2006/ole">
             <mc:AlternateContent xmlns:mc="http://schemas.openxmlformats.org/markup-compatibility/2006">
               <mc:Choice xmlns:v="urn:schemas-microsoft-com:vml" Requires="v">
-                <p:oleObj spid="_x0000_s94231" name="Equation" r:id="rId5" imgW="1143000" imgH="228600" progId="Equation.DSMT4">
+                <p:oleObj spid="_x0000_s94238" name="Equation" r:id="rId5" imgW="1143000" imgH="228600" progId="Equation.DSMT4">
                   <p:embed/>
                 </p:oleObj>
               </mc:Choice>
@@ -19905,6 +19851,9 @@
                     <p:cTn id="3" fill="hold">
                       <p:stCondLst>
                         <p:cond delay="indefinite"/>
+                        <p:cond evt="onBegin" delay="0">
+                          <p:tn val="2"/>
+                        </p:cond>
                       </p:stCondLst>
                       <p:childTnLst>
                         <p:par>
@@ -19914,7 +19863,7 @@
                             </p:stCondLst>
                             <p:childTnLst>
                               <p:par>
-                                <p:cTn id="5" presetID="10" presetClass="entr" presetSubtype="0" fill="hold" grpId="1" nodeType="clickEffect">
+                                <p:cTn id="5" presetID="10" presetClass="entr" presetSubtype="0" fill="hold" grpId="1" nodeType="afterEffect">
                                   <p:stCondLst>
                                     <p:cond delay="0"/>
                                   </p:stCondLst>
@@ -22191,7 +22140,7 @@
           <a:graphicData uri="http://schemas.openxmlformats.org/presentationml/2006/ole">
             <mc:AlternateContent xmlns:mc="http://schemas.openxmlformats.org/markup-compatibility/2006">
               <mc:Choice xmlns:v="urn:schemas-microsoft-com:vml" Requires="v">
-                <p:oleObj spid="_x0000_s98320" name="Equation" r:id="rId5" imgW="1244600" imgH="266700" progId="Equation.DSMT4">
+                <p:oleObj spid="_x0000_s98327" name="Equation" r:id="rId5" imgW="1244600" imgH="266700" progId="Equation.DSMT4">
                   <p:embed/>
                 </p:oleObj>
               </mc:Choice>
@@ -22248,7 +22197,7 @@
           <a:graphicData uri="http://schemas.openxmlformats.org/presentationml/2006/ole">
             <mc:AlternateContent xmlns:mc="http://schemas.openxmlformats.org/markup-compatibility/2006">
               <mc:Choice xmlns:v="urn:schemas-microsoft-com:vml" Requires="v">
-                <p:oleObj spid="_x0000_s98321" name="Equation" r:id="rId7" imgW="546100" imgH="228600" progId="Equation.DSMT4">
+                <p:oleObj spid="_x0000_s98328" name="Equation" r:id="rId7" imgW="546100" imgH="228600" progId="Equation.DSMT4">
                   <p:embed/>
                 </p:oleObj>
               </mc:Choice>
@@ -22824,7 +22773,7 @@
           <a:graphicData uri="http://schemas.openxmlformats.org/presentationml/2006/ole">
             <mc:AlternateContent xmlns:mc="http://schemas.openxmlformats.org/markup-compatibility/2006">
               <mc:Choice xmlns:v="urn:schemas-microsoft-com:vml" Requires="v">
-                <p:oleObj spid="_x0000_s100364" name="Equation" r:id="rId5" imgW="1244600" imgH="266700" progId="Equation.DSMT4">
+                <p:oleObj spid="_x0000_s100371" name="Equation" r:id="rId5" imgW="1244600" imgH="266700" progId="Equation.DSMT4">
                   <p:embed/>
                 </p:oleObj>
               </mc:Choice>
@@ -23001,7 +22950,7 @@
           <a:graphicData uri="http://schemas.openxmlformats.org/presentationml/2006/ole">
             <mc:AlternateContent xmlns:mc="http://schemas.openxmlformats.org/markup-compatibility/2006">
               <mc:Choice xmlns:v="urn:schemas-microsoft-com:vml" Requires="v">
-                <p:oleObj spid="_x0000_s100365" name="Equation" r:id="rId7" imgW="546100" imgH="228600" progId="Equation.DSMT4">
+                <p:oleObj spid="_x0000_s100372" name="Equation" r:id="rId7" imgW="546100" imgH="228600" progId="Equation.DSMT4">
                   <p:embed/>
                 </p:oleObj>
               </mc:Choice>
@@ -23133,7 +23082,7 @@
           <a:graphicData uri="http://schemas.openxmlformats.org/presentationml/2006/ole">
             <mc:AlternateContent xmlns:mc="http://schemas.openxmlformats.org/markup-compatibility/2006">
               <mc:Choice xmlns:v="urn:schemas-microsoft-com:vml" Requires="v">
-                <p:oleObj spid="_x0000_s102405" name="Equation" r:id="rId3" imgW="990600" imgH="393700" progId="Equation.DSMT4">
+                <p:oleObj spid="_x0000_s102409" name="Equation" r:id="rId3" imgW="990600" imgH="393700" progId="Equation.DSMT4">
                   <p:embed/>
                 </p:oleObj>
               </mc:Choice>
@@ -23272,13 +23221,6 @@
               </a:rPr>
               <a:t>111010101…</a:t>
             </a:r>
-            <a:endParaRPr lang="en-US" sz="5400" dirty="0" smtClean="0">
-              <a:solidFill>
-                <a:srgbClr val="0000FF"/>
-              </a:solidFill>
-              <a:latin typeface="Comic Sans MS"/>
-              <a:cs typeface="Comic Sans MS"/>
-            </a:endParaRPr>
           </a:p>
         </p:txBody>
       </p:sp>
@@ -23629,7 +23571,7 @@
           <a:graphicData uri="http://schemas.openxmlformats.org/presentationml/2006/ole">
             <mc:AlternateContent xmlns:mc="http://schemas.openxmlformats.org/markup-compatibility/2006">
               <mc:Choice xmlns:v="urn:schemas-microsoft-com:vml" Requires="v">
-                <p:oleObj spid="_x0000_s104450" name="Equation" r:id="rId3" imgW="990600" imgH="393700" progId="Equation.DSMT4">
+                <p:oleObj spid="_x0000_s104454" name="Equation" r:id="rId3" imgW="990600" imgH="393700" progId="Equation.DSMT4">
                   <p:embed/>
                 </p:oleObj>
               </mc:Choice>
@@ -23897,13 +23839,13 @@
   <p:clrMapOvr>
     <a:masterClrMapping/>
   </p:clrMapOvr>
-  <mc:AlternateContent xmlns:mc="http://schemas.openxmlformats.org/markup-compatibility/2006">
-    <mc:Choice xmlns:p14="http://schemas.microsoft.com/office/powerpoint/2010/main" Requires="p14">
+  <mc:AlternateContent xmlns:mc="http://schemas.openxmlformats.org/markup-compatibility/2006" xmlns:p14="http://schemas.microsoft.com/office/powerpoint/2010/main">
+    <mc:Choice Requires="p14">
       <p:transition spd="med" p14:dur="700" advClick="0">
         <p:fade/>
       </p:transition>
     </mc:Choice>
-    <mc:Fallback>
+    <mc:Fallback xmlns="">
       <p:transition xmlns:p14="http://schemas.microsoft.com/office/powerpoint/2010/main" spd="med" advClick="0">
         <p:fade/>
       </p:transition>
@@ -24578,7 +24520,7 @@
           <a:graphicData uri="http://schemas.openxmlformats.org/presentationml/2006/ole">
             <mc:AlternateContent xmlns:mc="http://schemas.openxmlformats.org/markup-compatibility/2006">
               <mc:Choice xmlns:v="urn:schemas-microsoft-com:vml" Requires="v">
-                <p:oleObj spid="_x0000_s70792" name="Equation" r:id="rId5" imgW="457200" imgH="393700" progId="Equation.DSMT4">
+                <p:oleObj spid="_x0000_s70799" name="Equation" r:id="rId5" imgW="457200" imgH="393700" progId="Equation.DSMT4">
                   <p:embed/>
                 </p:oleObj>
               </mc:Choice>
@@ -24649,7 +24591,7 @@
             <a:graphicData uri="http://schemas.openxmlformats.org/presentationml/2006/ole">
               <mc:AlternateContent xmlns:mc="http://schemas.openxmlformats.org/markup-compatibility/2006">
                 <mc:Choice xmlns:v="urn:schemas-microsoft-com:vml" Requires="v">
-                  <p:oleObj spid="_x0000_s70793" name="Equation" r:id="rId7" imgW="444500" imgH="393700" progId="Equation.DSMT4">
+                  <p:oleObj spid="_x0000_s70800" name="Equation" r:id="rId7" imgW="444500" imgH="393700" progId="Equation.DSMT4">
                     <p:embed/>
                   </p:oleObj>
                 </mc:Choice>
@@ -25122,7 +25064,7 @@
           <a:graphicData uri="http://schemas.openxmlformats.org/presentationml/2006/ole">
             <mc:AlternateContent xmlns:mc="http://schemas.openxmlformats.org/markup-compatibility/2006">
               <mc:Choice xmlns:v="urn:schemas-microsoft-com:vml" Requires="v">
-                <p:oleObj spid="_x0000_s63572" name="Equation" r:id="rId4" imgW="1333500" imgH="393700" progId="Equation.DSMT4">
+                <p:oleObj spid="_x0000_s63576" name="Equation" r:id="rId4" imgW="1333500" imgH="393700" progId="Equation.DSMT4">
                   <p:embed/>
                 </p:oleObj>
               </mc:Choice>
@@ -27661,7 +27603,7 @@
           <a:graphicData uri="http://schemas.openxmlformats.org/presentationml/2006/ole">
             <mc:AlternateContent xmlns:mc="http://schemas.openxmlformats.org/markup-compatibility/2006">
               <mc:Choice xmlns:v="urn:schemas-microsoft-com:vml" Requires="v">
-                <p:oleObj spid="_x0000_s71757" name="Equation" r:id="rId4" imgW="1333500" imgH="393700" progId="Equation.DSMT4">
+                <p:oleObj spid="_x0000_s71761" name="Equation" r:id="rId4" imgW="1333500" imgH="393700" progId="Equation.DSMT4">
                   <p:embed/>
                 </p:oleObj>
               </mc:Choice>
@@ -31167,7 +31109,7 @@
           <a:graphicData uri="http://schemas.openxmlformats.org/presentationml/2006/ole">
             <mc:AlternateContent xmlns:mc="http://schemas.openxmlformats.org/markup-compatibility/2006">
               <mc:Choice xmlns:v="urn:schemas-microsoft-com:vml" Requires="v">
-                <p:oleObj spid="_x0000_s73871" name="Equation" r:id="rId4" imgW="1333500" imgH="393700" progId="Equation.DSMT4">
+                <p:oleObj spid="_x0000_s73878" name="Equation" r:id="rId4" imgW="1333500" imgH="393700" progId="Equation.DSMT4">
                   <p:embed/>
                 </p:oleObj>
               </mc:Choice>
@@ -31410,7 +31352,7 @@
           <a:graphicData uri="http://schemas.openxmlformats.org/presentationml/2006/ole">
             <mc:AlternateContent xmlns:mc="http://schemas.openxmlformats.org/markup-compatibility/2006">
               <mc:Choice xmlns:v="urn:schemas-microsoft-com:vml" Requires="v">
-                <p:oleObj spid="_x0000_s73872" name="Equation" r:id="rId6" imgW="457200" imgH="393700" progId="Equation.DSMT4">
+                <p:oleObj spid="_x0000_s73879" name="Equation" r:id="rId6" imgW="457200" imgH="393700" progId="Equation.DSMT4">
                   <p:embed/>
                 </p:oleObj>
               </mc:Choice>
@@ -31673,21 +31615,30 @@
                             </p:childTnLst>
                           </p:cTn>
                         </p:par>
+                      </p:childTnLst>
+                    </p:cTn>
+                  </p:par>
+                  <p:par>
+                    <p:cTn id="21" fill="hold">
+                      <p:stCondLst>
+                        <p:cond delay="indefinite"/>
+                      </p:stCondLst>
+                      <p:childTnLst>
                         <p:par>
-                          <p:cTn id="21" fill="hold">
+                          <p:cTn id="22" fill="hold">
                             <p:stCondLst>
-                              <p:cond delay="1500"/>
+                              <p:cond delay="0"/>
                             </p:stCondLst>
                             <p:childTnLst>
                               <p:par>
-                                <p:cTn id="22" presetID="9" presetClass="entr" presetSubtype="0" fill="hold" grpId="0" nodeType="afterEffect">
+                                <p:cTn id="23" presetID="9" presetClass="entr" presetSubtype="0" fill="hold" grpId="0" nodeType="clickEffect">
                                   <p:stCondLst>
                                     <p:cond delay="0"/>
                                   </p:stCondLst>
                                   <p:childTnLst>
                                     <p:set>
                                       <p:cBhvr>
-                                        <p:cTn id="23" dur="1" fill="hold">
+                                        <p:cTn id="24" dur="1" fill="hold">
                                           <p:stCondLst>
                                             <p:cond delay="0"/>
                                           </p:stCondLst>
@@ -31705,7 +31656,7 @@
                                     </p:set>
                                     <p:animEffect transition="in" filter="dissolve">
                                       <p:cBhvr>
-                                        <p:cTn id="24" dur="500"/>
+                                        <p:cTn id="25" dur="500"/>
                                         <p:tgtEl>
                                           <p:spTgt spid="14"/>
                                         </p:tgtEl>
@@ -31721,26 +31672,26 @@
                     </p:cTn>
                   </p:par>
                   <p:par>
-                    <p:cTn id="25" fill="hold">
+                    <p:cTn id="26" fill="hold">
                       <p:stCondLst>
                         <p:cond delay="indefinite"/>
                       </p:stCondLst>
                       <p:childTnLst>
                         <p:par>
-                          <p:cTn id="26" fill="hold">
+                          <p:cTn id="27" fill="hold">
                             <p:stCondLst>
                               <p:cond delay="0"/>
                             </p:stCondLst>
                             <p:childTnLst>
                               <p:par>
-                                <p:cTn id="27" presetID="9" presetClass="entr" presetSubtype="0" fill="hold" nodeType="clickEffect">
+                                <p:cTn id="28" presetID="9" presetClass="entr" presetSubtype="0" fill="hold" nodeType="clickEffect">
                                   <p:stCondLst>
                                     <p:cond delay="0"/>
                                   </p:stCondLst>
                                   <p:childTnLst>
                                     <p:set>
                                       <p:cBhvr>
-                                        <p:cTn id="28" dur="1" fill="hold">
+                                        <p:cTn id="29" dur="1" fill="hold">
                                           <p:stCondLst>
                                             <p:cond delay="0"/>
                                           </p:stCondLst>
@@ -31762,7 +31713,7 @@
                                     </p:set>
                                     <p:animEffect transition="in" filter="dissolve">
                                       <p:cBhvr>
-                                        <p:cTn id="29" dur="500"/>
+                                        <p:cTn id="30" dur="500"/>
                                         <p:tgtEl>
                                           <p:spTgt spid="16">
                                             <p:txEl>
@@ -31776,14 +31727,14 @@
                                 </p:cTn>
                               </p:par>
                               <p:par>
-                                <p:cTn id="30" presetID="9" presetClass="entr" presetSubtype="0" fill="hold" nodeType="withEffect">
+                                <p:cTn id="31" presetID="9" presetClass="entr" presetSubtype="0" fill="hold" nodeType="withEffect">
                                   <p:stCondLst>
                                     <p:cond delay="0"/>
                                   </p:stCondLst>
                                   <p:childTnLst>
                                     <p:set>
                                       <p:cBhvr>
-                                        <p:cTn id="31" dur="1" fill="hold">
+                                        <p:cTn id="32" dur="1" fill="hold">
                                           <p:stCondLst>
                                             <p:cond delay="0"/>
                                           </p:stCondLst>
@@ -31801,7 +31752,7 @@
                                     </p:set>
                                     <p:animEffect transition="in" filter="dissolve">
                                       <p:cBhvr>
-                                        <p:cTn id="32" dur="500"/>
+                                        <p:cTn id="33" dur="500"/>
                                         <p:tgtEl>
                                           <p:spTgt spid="17"/>
                                         </p:tgtEl>
@@ -31817,26 +31768,26 @@
                     </p:cTn>
                   </p:par>
                   <p:par>
-                    <p:cTn id="33" fill="hold">
+                    <p:cTn id="34" fill="hold">
                       <p:stCondLst>
                         <p:cond delay="indefinite"/>
                       </p:stCondLst>
                       <p:childTnLst>
                         <p:par>
-                          <p:cTn id="34" fill="hold">
+                          <p:cTn id="35" fill="hold">
                             <p:stCondLst>
                               <p:cond delay="0"/>
                             </p:stCondLst>
                             <p:childTnLst>
                               <p:par>
-                                <p:cTn id="35" presetID="1" presetClass="entr" presetSubtype="0" fill="hold" nodeType="clickEffect">
+                                <p:cTn id="36" presetID="10" presetClass="entr" presetSubtype="0" fill="hold" nodeType="clickEffect">
                                   <p:stCondLst>
                                     <p:cond delay="0"/>
                                   </p:stCondLst>
                                   <p:childTnLst>
                                     <p:set>
                                       <p:cBhvr>
-                                        <p:cTn id="36" dur="1" fill="hold">
+                                        <p:cTn id="37" dur="1" fill="hold">
                                           <p:stCondLst>
                                             <p:cond delay="0"/>
                                           </p:stCondLst>
@@ -31856,27 +31807,30 @@
                                         <p:strVal val="visible"/>
                                       </p:to>
                                     </p:set>
+                                    <p:animEffect transition="in" filter="fade">
+                                      <p:cBhvr>
+                                        <p:cTn id="38" dur="500"/>
+                                        <p:tgtEl>
+                                          <p:spTgt spid="16">
+                                            <p:txEl>
+                                              <p:pRg st="1" end="1"/>
+                                            </p:txEl>
+                                          </p:spTgt>
+                                        </p:tgtEl>
+                                      </p:cBhvr>
+                                    </p:animEffect>
                                   </p:childTnLst>
                                 </p:cTn>
                               </p:par>
-                            </p:childTnLst>
-                          </p:cTn>
-                        </p:par>
-                        <p:par>
-                          <p:cTn id="37" fill="hold">
-                            <p:stCondLst>
-                              <p:cond delay="0"/>
-                            </p:stCondLst>
-                            <p:childTnLst>
                               <p:par>
-                                <p:cTn id="38" presetID="1" presetClass="entr" presetSubtype="0" fill="hold" nodeType="afterEffect">
+                                <p:cTn id="39" presetID="10" presetClass="entr" presetSubtype="0" fill="hold" nodeType="withEffect">
                                   <p:stCondLst>
                                     <p:cond delay="0"/>
                                   </p:stCondLst>
                                   <p:childTnLst>
                                     <p:set>
                                       <p:cBhvr>
-                                        <p:cTn id="39" dur="1" fill="hold">
+                                        <p:cTn id="40" dur="1" fill="hold">
                                           <p:stCondLst>
                                             <p:cond delay="0"/>
                                           </p:stCondLst>
@@ -31896,6 +31850,18 @@
                                         <p:strVal val="visible"/>
                                       </p:to>
                                     </p:set>
+                                    <p:animEffect transition="in" filter="fade">
+                                      <p:cBhvr>
+                                        <p:cTn id="41" dur="500"/>
+                                        <p:tgtEl>
+                                          <p:spTgt spid="16">
+                                            <p:txEl>
+                                              <p:pRg st="2" end="2"/>
+                                            </p:txEl>
+                                          </p:spTgt>
+                                        </p:tgtEl>
+                                      </p:cBhvr>
+                                    </p:animEffect>
                                   </p:childTnLst>
                                 </p:cTn>
                               </p:par>
@@ -32066,7 +32032,7 @@
           <a:graphicData uri="http://schemas.openxmlformats.org/presentationml/2006/ole">
             <mc:AlternateContent xmlns:mc="http://schemas.openxmlformats.org/markup-compatibility/2006">
               <mc:Choice xmlns:v="urn:schemas-microsoft-com:vml" Requires="v">
-                <p:oleObj spid="_x0000_s65728" name="Equation" r:id="rId3" imgW="1727200" imgH="393700" progId="Equation.DSMT4">
+                <p:oleObj spid="_x0000_s65738" name="Equation" r:id="rId3" imgW="1727200" imgH="393700" progId="Equation.DSMT4">
                   <p:embed/>
                 </p:oleObj>
               </mc:Choice>
@@ -32123,7 +32089,7 @@
           <a:graphicData uri="http://schemas.openxmlformats.org/presentationml/2006/ole">
             <mc:AlternateContent xmlns:mc="http://schemas.openxmlformats.org/markup-compatibility/2006">
               <mc:Choice xmlns:v="urn:schemas-microsoft-com:vml" Requires="v">
-                <p:oleObj spid="_x0000_s65729" name="Equation" r:id="rId5" imgW="1143000" imgH="228600" progId="Equation.3">
+                <p:oleObj spid="_x0000_s65739" name="Equation" r:id="rId5" imgW="1143000" imgH="228600" progId="Equation.3">
                   <p:embed/>
                 </p:oleObj>
               </mc:Choice>
@@ -32180,7 +32146,7 @@
           <a:graphicData uri="http://schemas.openxmlformats.org/presentationml/2006/ole">
             <mc:AlternateContent xmlns:mc="http://schemas.openxmlformats.org/markup-compatibility/2006">
               <mc:Choice xmlns:v="urn:schemas-microsoft-com:vml" Requires="v">
-                <p:oleObj spid="_x0000_s65730" name="Equation" r:id="rId7" imgW="698500" imgH="393700" progId="Equation.DSMT4">
+                <p:oleObj spid="_x0000_s65740" name="Equation" r:id="rId7" imgW="698500" imgH="393700" progId="Equation.DSMT4">
                   <p:embed/>
                 </p:oleObj>
               </mc:Choice>
@@ -32520,7 +32486,7 @@
           <a:graphicData uri="http://schemas.openxmlformats.org/presentationml/2006/ole">
             <mc:AlternateContent xmlns:mc="http://schemas.openxmlformats.org/markup-compatibility/2006">
               <mc:Choice xmlns:v="urn:schemas-microsoft-com:vml" Requires="v">
-                <p:oleObj spid="_x0000_s85160" name="Equation" r:id="rId4" imgW="457200" imgH="393700" progId="Equation.DSMT4">
+                <p:oleObj spid="_x0000_s85173" name="Equation" r:id="rId4" imgW="457200" imgH="393700" progId="Equation.DSMT4">
                   <p:embed/>
                 </p:oleObj>
               </mc:Choice>
@@ -32577,7 +32543,7 @@
           <a:graphicData uri="http://schemas.openxmlformats.org/presentationml/2006/ole">
             <mc:AlternateContent xmlns:mc="http://schemas.openxmlformats.org/markup-compatibility/2006">
               <mc:Choice xmlns:v="urn:schemas-microsoft-com:vml" Requires="v">
-                <p:oleObj spid="_x0000_s85161" name="Equation" r:id="rId6" imgW="2222500" imgH="393700" progId="Equation.DSMT4">
+                <p:oleObj spid="_x0000_s85174" name="Equation" r:id="rId6" imgW="2222500" imgH="393700" progId="Equation.DSMT4">
                   <p:embed/>
                 </p:oleObj>
               </mc:Choice>
@@ -32622,7 +32588,7 @@
         </p:nvSpPr>
         <p:spPr bwMode="auto">
           <a:xfrm>
-            <a:off x="6144088" y="2805670"/>
+            <a:off x="6144088" y="3148570"/>
             <a:ext cx="2524852" cy="850647"/>
           </a:xfrm>
           <a:prstGeom prst="rect">
@@ -32807,20 +32773,20 @@
           <p:nvPr>
             <p:extLst>
               <p:ext uri="{D42A27DB-BD31-4B8C-83A1-F6EECF244321}">
-                <p14:modId xmlns:p14="http://schemas.microsoft.com/office/powerpoint/2010/main" val="120070582"/>
+                <p14:modId xmlns:p14="http://schemas.microsoft.com/office/powerpoint/2010/main" val="1608636893"/>
               </p:ext>
             </p:extLst>
           </p:nvPr>
         </p:nvGraphicFramePr>
         <p:xfrm>
-          <a:off x="2816002" y="2476896"/>
+          <a:off x="2816002" y="2819796"/>
           <a:ext cx="2995613" cy="1292225"/>
         </p:xfrm>
         <a:graphic>
           <a:graphicData uri="http://schemas.openxmlformats.org/presentationml/2006/ole">
             <mc:AlternateContent xmlns:mc="http://schemas.openxmlformats.org/markup-compatibility/2006">
               <mc:Choice xmlns:v="urn:schemas-microsoft-com:vml" Requires="v">
-                <p:oleObj spid="_x0000_s85162" name="Equation" r:id="rId8" imgW="914400" imgH="393700" progId="Equation.DSMT4">
+                <p:oleObj spid="_x0000_s85175" name="Equation" r:id="rId8" imgW="914400" imgH="393700" progId="Equation.DSMT4">
                   <p:embed/>
                 </p:oleObj>
               </mc:Choice>
@@ -32841,7 +32807,7 @@
                     </p:blipFill>
                     <p:spPr>
                       <a:xfrm>
-                        <a:off x="2816002" y="2476896"/>
+                        <a:off x="2816002" y="2819796"/>
                         <a:ext cx="2995613" cy="1292225"/>
                       </a:xfrm>
                       <a:prstGeom prst="rect">
@@ -32867,7 +32833,7 @@
         </p:nvSpPr>
         <p:spPr>
           <a:xfrm>
-            <a:off x="427089" y="1501879"/>
+            <a:off x="884289" y="1844779"/>
             <a:ext cx="1112345" cy="807374"/>
           </a:xfrm>
         </p:spPr>
@@ -32892,20 +32858,20 @@
           <p:nvPr>
             <p:extLst>
               <p:ext uri="{D42A27DB-BD31-4B8C-83A1-F6EECF244321}">
-                <p14:modId xmlns:p14="http://schemas.microsoft.com/office/powerpoint/2010/main" val="2171468104"/>
+                <p14:modId xmlns:p14="http://schemas.microsoft.com/office/powerpoint/2010/main" val="3711659256"/>
               </p:ext>
             </p:extLst>
           </p:nvPr>
         </p:nvGraphicFramePr>
         <p:xfrm>
-          <a:off x="1802698" y="1139565"/>
+          <a:off x="1802698" y="1482465"/>
           <a:ext cx="4826429" cy="1583429"/>
         </p:xfrm>
         <a:graphic>
           <a:graphicData uri="http://schemas.openxmlformats.org/presentationml/2006/ole">
             <mc:AlternateContent xmlns:mc="http://schemas.openxmlformats.org/markup-compatibility/2006">
               <mc:Choice xmlns:v="urn:schemas-microsoft-com:vml" Requires="v">
-                <p:oleObj spid="_x0000_s85163" name="Equation" r:id="rId10" imgW="1473200" imgH="482600" progId="Equation.3">
+                <p:oleObj spid="_x0000_s85176" name="Equation" r:id="rId10" imgW="1473200" imgH="482600" progId="Equation.3">
                   <p:embed/>
                 </p:oleObj>
               </mc:Choice>
@@ -32926,7 +32892,7 @@
                     </p:blipFill>
                     <p:spPr>
                       <a:xfrm>
-                        <a:off x="1802698" y="1139565"/>
+                        <a:off x="1802698" y="1482465"/>
                         <a:ext cx="4826429" cy="1583429"/>
                       </a:xfrm>
                       <a:prstGeom prst="rect">
@@ -32950,7 +32916,7 @@
         </p:nvSpPr>
         <p:spPr bwMode="auto">
           <a:xfrm>
-            <a:off x="7093223" y="1750499"/>
+            <a:off x="7093223" y="2093399"/>
             <a:ext cx="1258210" cy="780057"/>
           </a:xfrm>
           <a:prstGeom prst="rect">
@@ -33679,7 +33645,7 @@
           <a:graphicData uri="http://schemas.openxmlformats.org/presentationml/2006/ole">
             <mc:AlternateContent xmlns:mc="http://schemas.openxmlformats.org/markup-compatibility/2006">
               <mc:Choice xmlns:v="urn:schemas-microsoft-com:vml" Requires="v">
-                <p:oleObj spid="_x0000_s1038" name="Equation" r:id="rId4" imgW="1320800" imgH="393700" progId="Equation.DSMT4">
+                <p:oleObj spid="_x0000_s1042" name="Equation" r:id="rId4" imgW="1320800" imgH="393700" progId="Equation.DSMT4">
                   <p:embed/>
                 </p:oleObj>
               </mc:Choice>

</xml_diff>

<commit_message>
tweak TP_preserved_under_isomorphism, typos FP_partial_order_short_answer, cantor.pptx
</commit_message>
<xml_diff>
--- a/spring15/slidesS15/cantor.pptx
+++ b/spring15/slidesS15/cantor.pptx
@@ -6993,7 +6993,7 @@
           <a:graphicData uri="http://schemas.openxmlformats.org/presentationml/2006/ole">
             <mc:AlternateContent xmlns:mc="http://schemas.openxmlformats.org/markup-compatibility/2006">
               <mc:Choice xmlns:v="urn:schemas-microsoft-com:vml" Requires="v">
-                <p:oleObj spid="_x0000_s90154" name="Equation" r:id="rId5" imgW="1587500" imgH="215900" progId="Equation.DSMT4">
+                <p:oleObj spid="_x0000_s90159" name="Equation" r:id="rId5" imgW="1587500" imgH="215900" progId="Equation.DSMT4">
                   <p:embed/>
                 </p:oleObj>
               </mc:Choice>
@@ -8506,7 +8506,7 @@
           <a:graphicData uri="http://schemas.openxmlformats.org/presentationml/2006/ole">
             <mc:AlternateContent xmlns:mc="http://schemas.openxmlformats.org/markup-compatibility/2006">
               <mc:Choice xmlns:v="urn:schemas-microsoft-com:vml" Requires="v">
-                <p:oleObj spid="_x0000_s90155" name="Equation" r:id="rId7" imgW="2463800" imgH="228600" progId="Equation.DSMT4">
+                <p:oleObj spid="_x0000_s90160" name="Equation" r:id="rId7" imgW="2463800" imgH="228600" progId="Equation.DSMT4">
                   <p:embed/>
                 </p:oleObj>
               </mc:Choice>
@@ -8891,7 +8891,7 @@
           <a:graphicData uri="http://schemas.openxmlformats.org/presentationml/2006/ole">
             <mc:AlternateContent xmlns:mc="http://schemas.openxmlformats.org/markup-compatibility/2006">
               <mc:Choice xmlns:v="urn:schemas-microsoft-com:vml" Requires="v">
-                <p:oleObj spid="_x0000_s91180" name="Equation" r:id="rId5" imgW="1587500" imgH="215900" progId="Equation.DSMT4">
+                <p:oleObj spid="_x0000_s91185" name="Equation" r:id="rId5" imgW="1587500" imgH="215900" progId="Equation.DSMT4">
                   <p:embed/>
                 </p:oleObj>
               </mc:Choice>
@@ -10867,7 +10867,7 @@
           <a:graphicData uri="http://schemas.openxmlformats.org/presentationml/2006/ole">
             <mc:AlternateContent xmlns:mc="http://schemas.openxmlformats.org/markup-compatibility/2006">
               <mc:Choice xmlns:v="urn:schemas-microsoft-com:vml" Requires="v">
-                <p:oleObj spid="_x0000_s91181" name="Equation" r:id="rId7" imgW="2463800" imgH="228600" progId="Equation.DSMT4">
+                <p:oleObj spid="_x0000_s91186" name="Equation" r:id="rId7" imgW="2463800" imgH="228600" progId="Equation.DSMT4">
                   <p:embed/>
                 </p:oleObj>
               </mc:Choice>
@@ -11027,7 +11027,7 @@
           <a:graphicData uri="http://schemas.openxmlformats.org/presentationml/2006/ole">
             <mc:AlternateContent xmlns:mc="http://schemas.openxmlformats.org/markup-compatibility/2006">
               <mc:Choice xmlns:v="urn:schemas-microsoft-com:vml" Requires="v">
-                <p:oleObj spid="_x0000_s92198" name="Equation" r:id="rId5" imgW="1587500" imgH="215900" progId="Equation.DSMT4">
+                <p:oleObj spid="_x0000_s92203" name="Equation" r:id="rId5" imgW="1587500" imgH="215900" progId="Equation.DSMT4">
                   <p:embed/>
                 </p:oleObj>
               </mc:Choice>
@@ -13098,7 +13098,7 @@
           <a:graphicData uri="http://schemas.openxmlformats.org/presentationml/2006/ole">
             <mc:AlternateContent xmlns:mc="http://schemas.openxmlformats.org/markup-compatibility/2006">
               <mc:Choice xmlns:v="urn:schemas-microsoft-com:vml" Requires="v">
-                <p:oleObj spid="_x0000_s92199" name="Equation" r:id="rId7" imgW="2463800" imgH="228600" progId="Equation.DSMT4">
+                <p:oleObj spid="_x0000_s92204" name="Equation" r:id="rId7" imgW="2463800" imgH="228600" progId="Equation.DSMT4">
                   <p:embed/>
                 </p:oleObj>
               </mc:Choice>
@@ -13363,7 +13363,7 @@
           <a:graphicData uri="http://schemas.openxmlformats.org/presentationml/2006/ole">
             <mc:AlternateContent xmlns:mc="http://schemas.openxmlformats.org/markup-compatibility/2006">
               <mc:Choice xmlns:v="urn:schemas-microsoft-com:vml" Requires="v">
-                <p:oleObj spid="_x0000_s93222" name="Equation" r:id="rId5" imgW="1587500" imgH="215900" progId="Equation.DSMT4">
+                <p:oleObj spid="_x0000_s93227" name="Equation" r:id="rId5" imgW="1587500" imgH="215900" progId="Equation.DSMT4">
                   <p:embed/>
                 </p:oleObj>
               </mc:Choice>
@@ -15418,7 +15418,7 @@
           <a:graphicData uri="http://schemas.openxmlformats.org/presentationml/2006/ole">
             <mc:AlternateContent xmlns:mc="http://schemas.openxmlformats.org/markup-compatibility/2006">
               <mc:Choice xmlns:v="urn:schemas-microsoft-com:vml" Requires="v">
-                <p:oleObj spid="_x0000_s93223" name="Equation" r:id="rId7" imgW="2463800" imgH="228600" progId="Equation.DSMT4">
+                <p:oleObj spid="_x0000_s93228" name="Equation" r:id="rId7" imgW="2463800" imgH="228600" progId="Equation.DSMT4">
                   <p:embed/>
                 </p:oleObj>
               </mc:Choice>
@@ -15936,7 +15936,7 @@
           <a:graphicData uri="http://schemas.openxmlformats.org/presentationml/2006/ole">
             <mc:AlternateContent xmlns:mc="http://schemas.openxmlformats.org/markup-compatibility/2006">
               <mc:Choice xmlns:v="urn:schemas-microsoft-com:vml" Requires="v">
-                <p:oleObj spid="_x0000_s79942" name="Equation" r:id="rId5" imgW="889000" imgH="228600" progId="Equation.DSMT4">
+                <p:oleObj spid="_x0000_s79945" name="Equation" r:id="rId5" imgW="889000" imgH="228600" progId="Equation.DSMT4">
                   <p:embed/>
                 </p:oleObj>
               </mc:Choice>
@@ -20565,7 +20565,7 @@
           <a:graphicData uri="http://schemas.openxmlformats.org/presentationml/2006/ole">
             <mc:AlternateContent xmlns:mc="http://schemas.openxmlformats.org/markup-compatibility/2006">
               <mc:Choice xmlns:v="urn:schemas-microsoft-com:vml" Requires="v">
-                <p:oleObj spid="_x0000_s94248" name="Equation" r:id="rId4" imgW="546100" imgH="228600" progId="Equation.DSMT4">
+                <p:oleObj spid="_x0000_s94253" name="Equation" r:id="rId4" imgW="546100" imgH="228600" progId="Equation.DSMT4">
                   <p:embed/>
                 </p:oleObj>
               </mc:Choice>
@@ -20671,7 +20671,7 @@
           <a:graphicData uri="http://schemas.openxmlformats.org/presentationml/2006/ole">
             <mc:AlternateContent xmlns:mc="http://schemas.openxmlformats.org/markup-compatibility/2006">
               <mc:Choice xmlns:v="urn:schemas-microsoft-com:vml" Requires="v">
-                <p:oleObj spid="_x0000_s94249" name="Equation" r:id="rId6" imgW="1143000" imgH="228600" progId="Equation.DSMT4">
+                <p:oleObj spid="_x0000_s94254" name="Equation" r:id="rId6" imgW="1143000" imgH="228600" progId="Equation.DSMT4">
                   <p:embed/>
                 </p:oleObj>
               </mc:Choice>
@@ -23033,7 +23033,7 @@
           <a:graphicData uri="http://schemas.openxmlformats.org/presentationml/2006/ole">
             <mc:AlternateContent xmlns:mc="http://schemas.openxmlformats.org/markup-compatibility/2006">
               <mc:Choice xmlns:v="urn:schemas-microsoft-com:vml" Requires="v">
-                <p:oleObj spid="_x0000_s98338" name="Equation" r:id="rId5" imgW="1244600" imgH="266700" progId="Equation.DSMT4">
+                <p:oleObj spid="_x0000_s98343" name="Equation" r:id="rId5" imgW="1244600" imgH="266700" progId="Equation.DSMT4">
                   <p:embed/>
                 </p:oleObj>
               </mc:Choice>
@@ -23090,7 +23090,7 @@
           <a:graphicData uri="http://schemas.openxmlformats.org/presentationml/2006/ole">
             <mc:AlternateContent xmlns:mc="http://schemas.openxmlformats.org/markup-compatibility/2006">
               <mc:Choice xmlns:v="urn:schemas-microsoft-com:vml" Requires="v">
-                <p:oleObj spid="_x0000_s98339" name="Equation" r:id="rId7" imgW="546100" imgH="228600" progId="Equation.DSMT4">
+                <p:oleObj spid="_x0000_s98344" name="Equation" r:id="rId7" imgW="546100" imgH="228600" progId="Equation.DSMT4">
                   <p:embed/>
                 </p:oleObj>
               </mc:Choice>
@@ -23666,7 +23666,7 @@
           <a:graphicData uri="http://schemas.openxmlformats.org/presentationml/2006/ole">
             <mc:AlternateContent xmlns:mc="http://schemas.openxmlformats.org/markup-compatibility/2006">
               <mc:Choice xmlns:v="urn:schemas-microsoft-com:vml" Requires="v">
-                <p:oleObj spid="_x0000_s100382" name="Equation" r:id="rId5" imgW="1244600" imgH="266700" progId="Equation.DSMT4">
+                <p:oleObj spid="_x0000_s100387" name="Equation" r:id="rId5" imgW="1244600" imgH="266700" progId="Equation.DSMT4">
                   <p:embed/>
                 </p:oleObj>
               </mc:Choice>
@@ -23843,7 +23843,7 @@
           <a:graphicData uri="http://schemas.openxmlformats.org/presentationml/2006/ole">
             <mc:AlternateContent xmlns:mc="http://schemas.openxmlformats.org/markup-compatibility/2006">
               <mc:Choice xmlns:v="urn:schemas-microsoft-com:vml" Requires="v">
-                <p:oleObj spid="_x0000_s100383" name="Equation" r:id="rId7" imgW="546100" imgH="228600" progId="Equation.DSMT4">
+                <p:oleObj spid="_x0000_s100388" name="Equation" r:id="rId7" imgW="546100" imgH="228600" progId="Equation.DSMT4">
                   <p:embed/>
                 </p:oleObj>
               </mc:Choice>
@@ -23975,7 +23975,7 @@
           <a:graphicData uri="http://schemas.openxmlformats.org/presentationml/2006/ole">
             <mc:AlternateContent xmlns:mc="http://schemas.openxmlformats.org/markup-compatibility/2006">
               <mc:Choice xmlns:v="urn:schemas-microsoft-com:vml" Requires="v">
-                <p:oleObj spid="_x0000_s102416" name="Equation" r:id="rId4" imgW="990600" imgH="393700" progId="Equation.DSMT4">
+                <p:oleObj spid="_x0000_s102419" name="Equation" r:id="rId4" imgW="990600" imgH="393700" progId="Equation.DSMT4">
                   <p:embed/>
                 </p:oleObj>
               </mc:Choice>
@@ -24069,14 +24069,34 @@
           </a:p>
           <a:p>
             <a:r>
-              <a:rPr lang="en-US" sz="5400" dirty="0" smtClean="0">
+              <a:rPr lang="en-US" sz="5400" dirty="0">
                 <a:solidFill>
                   <a:srgbClr val="0000FF"/>
                 </a:solidFill>
                 <a:latin typeface="Comic Sans MS"/>
                 <a:cs typeface="Comic Sans MS"/>
               </a:rPr>
-              <a:t>3 1/3</a:t>
+              <a:t>7</a:t>
+            </a:r>
+            <a:r>
+              <a:rPr lang="en-US" sz="5400" dirty="0" smtClean="0">
+                <a:solidFill>
+                  <a:srgbClr val="0000FF"/>
+                </a:solidFill>
+                <a:latin typeface="Comic Sans MS"/>
+                <a:cs typeface="Comic Sans MS"/>
+              </a:rPr>
+              <a:t> </a:t>
+            </a:r>
+            <a:r>
+              <a:rPr lang="en-US" sz="5400" dirty="0" smtClean="0">
+                <a:solidFill>
+                  <a:srgbClr val="0000FF"/>
+                </a:solidFill>
+                <a:latin typeface="Comic Sans MS"/>
+                <a:cs typeface="Comic Sans MS"/>
+              </a:rPr>
+              <a:t>1/3</a:t>
             </a:r>
             <a:r>
               <a:rPr lang="en-US" sz="5400" dirty="0" smtClean="0">
@@ -24093,7 +24113,17 @@
                 <a:latin typeface="Comic Sans MS"/>
                 <a:cs typeface="Comic Sans MS"/>
               </a:rPr>
-              <a:t>111.010101…</a:t>
+              <a:t>111.010101</a:t>
+            </a:r>
+            <a:r>
+              <a:rPr lang="en-US" sz="5400" dirty="0" smtClean="0">
+                <a:solidFill>
+                  <a:srgbClr val="0000FF"/>
+                </a:solidFill>
+                <a:latin typeface="Comic Sans MS"/>
+                <a:cs typeface="Comic Sans MS"/>
+              </a:rPr>
+              <a:t>…</a:t>
             </a:r>
           </a:p>
           <a:p>
@@ -24112,7 +24142,17 @@
                 <a:latin typeface="Comic Sans MS"/>
                 <a:cs typeface="Comic Sans MS"/>
               </a:rPr>
-              <a:t>111010101…</a:t>
+              <a:t>111010101</a:t>
+            </a:r>
+            <a:r>
+              <a:rPr lang="en-US" sz="5400" dirty="0" smtClean="0">
+                <a:solidFill>
+                  <a:srgbClr val="0000FF"/>
+                </a:solidFill>
+                <a:latin typeface="Comic Sans MS"/>
+                <a:cs typeface="Comic Sans MS"/>
+              </a:rPr>
+              <a:t>…</a:t>
             </a:r>
           </a:p>
         </p:txBody>
@@ -24464,7 +24504,7 @@
           <a:graphicData uri="http://schemas.openxmlformats.org/presentationml/2006/ole">
             <mc:AlternateContent xmlns:mc="http://schemas.openxmlformats.org/markup-compatibility/2006">
               <mc:Choice xmlns:v="urn:schemas-microsoft-com:vml" Requires="v">
-                <p:oleObj spid="_x0000_s104461" name="Equation" r:id="rId4" imgW="990600" imgH="393700" progId="Equation.DSMT4">
+                <p:oleObj spid="_x0000_s104464" name="Equation" r:id="rId4" imgW="990600" imgH="393700" progId="Equation.DSMT4">
                   <p:embed/>
                 </p:oleObj>
               </mc:Choice>
@@ -25413,7 +25453,7 @@
           <a:graphicData uri="http://schemas.openxmlformats.org/presentationml/2006/ole">
             <mc:AlternateContent xmlns:mc="http://schemas.openxmlformats.org/markup-compatibility/2006">
               <mc:Choice xmlns:v="urn:schemas-microsoft-com:vml" Requires="v">
-                <p:oleObj spid="_x0000_s70810" name="Equation" r:id="rId5" imgW="457200" imgH="393700" progId="Equation.DSMT4">
+                <p:oleObj spid="_x0000_s70815" name="Equation" r:id="rId5" imgW="457200" imgH="393700" progId="Equation.DSMT4">
                   <p:embed/>
                 </p:oleObj>
               </mc:Choice>
@@ -25484,7 +25524,7 @@
             <a:graphicData uri="http://schemas.openxmlformats.org/presentationml/2006/ole">
               <mc:AlternateContent xmlns:mc="http://schemas.openxmlformats.org/markup-compatibility/2006">
                 <mc:Choice xmlns:v="urn:schemas-microsoft-com:vml" Requires="v">
-                  <p:oleObj spid="_x0000_s70811" name="Equation" r:id="rId7" imgW="444500" imgH="393700" progId="Equation.DSMT4">
+                  <p:oleObj spid="_x0000_s70816" name="Equation" r:id="rId7" imgW="444500" imgH="393700" progId="Equation.DSMT4">
                     <p:embed/>
                   </p:oleObj>
                 </mc:Choice>
@@ -25957,7 +25997,7 @@
           <a:graphicData uri="http://schemas.openxmlformats.org/presentationml/2006/ole">
             <mc:AlternateContent xmlns:mc="http://schemas.openxmlformats.org/markup-compatibility/2006">
               <mc:Choice xmlns:v="urn:schemas-microsoft-com:vml" Requires="v">
-                <p:oleObj spid="_x0000_s63583" name="Equation" r:id="rId5" imgW="1333500" imgH="393700" progId="Equation.DSMT4">
+                <p:oleObj spid="_x0000_s63586" name="Equation" r:id="rId5" imgW="1333500" imgH="393700" progId="Equation.DSMT4">
                   <p:embed/>
                 </p:oleObj>
               </mc:Choice>
@@ -28496,7 +28536,7 @@
           <a:graphicData uri="http://schemas.openxmlformats.org/presentationml/2006/ole">
             <mc:AlternateContent xmlns:mc="http://schemas.openxmlformats.org/markup-compatibility/2006">
               <mc:Choice xmlns:v="urn:schemas-microsoft-com:vml" Requires="v">
-                <p:oleObj spid="_x0000_s71768" name="Equation" r:id="rId5" imgW="1333500" imgH="393700" progId="Equation.DSMT4">
+                <p:oleObj spid="_x0000_s71771" name="Equation" r:id="rId5" imgW="1333500" imgH="393700" progId="Equation.DSMT4">
                   <p:embed/>
                 </p:oleObj>
               </mc:Choice>
@@ -32002,7 +32042,7 @@
           <a:graphicData uri="http://schemas.openxmlformats.org/presentationml/2006/ole">
             <mc:AlternateContent xmlns:mc="http://schemas.openxmlformats.org/markup-compatibility/2006">
               <mc:Choice xmlns:v="urn:schemas-microsoft-com:vml" Requires="v">
-                <p:oleObj spid="_x0000_s73889" name="Equation" r:id="rId4" imgW="1333500" imgH="393700" progId="Equation.DSMT4">
+                <p:oleObj spid="_x0000_s73894" name="Equation" r:id="rId4" imgW="1333500" imgH="393700" progId="Equation.DSMT4">
                   <p:embed/>
                 </p:oleObj>
               </mc:Choice>
@@ -32245,7 +32285,7 @@
           <a:graphicData uri="http://schemas.openxmlformats.org/presentationml/2006/ole">
             <mc:AlternateContent xmlns:mc="http://schemas.openxmlformats.org/markup-compatibility/2006">
               <mc:Choice xmlns:v="urn:schemas-microsoft-com:vml" Requires="v">
-                <p:oleObj spid="_x0000_s73890" name="Equation" r:id="rId6" imgW="457200" imgH="393700" progId="Equation.DSMT4">
+                <p:oleObj spid="_x0000_s73895" name="Equation" r:id="rId6" imgW="457200" imgH="393700" progId="Equation.DSMT4">
                   <p:embed/>
                 </p:oleObj>
               </mc:Choice>
@@ -32925,7 +32965,7 @@
           <a:graphicData uri="http://schemas.openxmlformats.org/presentationml/2006/ole">
             <mc:AlternateContent xmlns:mc="http://schemas.openxmlformats.org/markup-compatibility/2006">
               <mc:Choice xmlns:v="urn:schemas-microsoft-com:vml" Requires="v">
-                <p:oleObj spid="_x0000_s65753" name="Equation" r:id="rId3" imgW="1727200" imgH="393700" progId="Equation.DSMT4">
+                <p:oleObj spid="_x0000_s65760" name="Equation" r:id="rId3" imgW="1727200" imgH="393700" progId="Equation.DSMT4">
                   <p:embed/>
                 </p:oleObj>
               </mc:Choice>
@@ -32982,7 +33022,7 @@
           <a:graphicData uri="http://schemas.openxmlformats.org/presentationml/2006/ole">
             <mc:AlternateContent xmlns:mc="http://schemas.openxmlformats.org/markup-compatibility/2006">
               <mc:Choice xmlns:v="urn:schemas-microsoft-com:vml" Requires="v">
-                <p:oleObj spid="_x0000_s65754" name="Equation" r:id="rId5" imgW="1143000" imgH="228600" progId="Equation.3">
+                <p:oleObj spid="_x0000_s65761" name="Equation" r:id="rId5" imgW="1143000" imgH="228600" progId="Equation.3">
                   <p:embed/>
                 </p:oleObj>
               </mc:Choice>
@@ -33039,7 +33079,7 @@
           <a:graphicData uri="http://schemas.openxmlformats.org/presentationml/2006/ole">
             <mc:AlternateContent xmlns:mc="http://schemas.openxmlformats.org/markup-compatibility/2006">
               <mc:Choice xmlns:v="urn:schemas-microsoft-com:vml" Requires="v">
-                <p:oleObj spid="_x0000_s65755" name="Equation" r:id="rId7" imgW="698500" imgH="393700" progId="Equation.DSMT4">
+                <p:oleObj spid="_x0000_s65762" name="Equation" r:id="rId7" imgW="698500" imgH="393700" progId="Equation.DSMT4">
                   <p:embed/>
                 </p:oleObj>
               </mc:Choice>
@@ -33379,7 +33419,7 @@
           <a:graphicData uri="http://schemas.openxmlformats.org/presentationml/2006/ole">
             <mc:AlternateContent xmlns:mc="http://schemas.openxmlformats.org/markup-compatibility/2006">
               <mc:Choice xmlns:v="urn:schemas-microsoft-com:vml" Requires="v">
-                <p:oleObj spid="_x0000_s85192" name="Equation" r:id="rId5" imgW="457200" imgH="393700" progId="Equation.DSMT4">
+                <p:oleObj spid="_x0000_s85201" name="Equation" r:id="rId5" imgW="457200" imgH="393700" progId="Equation.DSMT4">
                   <p:embed/>
                 </p:oleObj>
               </mc:Choice>
@@ -33436,7 +33476,7 @@
           <a:graphicData uri="http://schemas.openxmlformats.org/presentationml/2006/ole">
             <mc:AlternateContent xmlns:mc="http://schemas.openxmlformats.org/markup-compatibility/2006">
               <mc:Choice xmlns:v="urn:schemas-microsoft-com:vml" Requires="v">
-                <p:oleObj spid="_x0000_s85193" name="Equation" r:id="rId7" imgW="2222500" imgH="393700" progId="Equation.DSMT4">
+                <p:oleObj spid="_x0000_s85202" name="Equation" r:id="rId7" imgW="2222500" imgH="393700" progId="Equation.DSMT4">
                   <p:embed/>
                 </p:oleObj>
               </mc:Choice>
@@ -33679,7 +33719,7 @@
           <a:graphicData uri="http://schemas.openxmlformats.org/presentationml/2006/ole">
             <mc:AlternateContent xmlns:mc="http://schemas.openxmlformats.org/markup-compatibility/2006">
               <mc:Choice xmlns:v="urn:schemas-microsoft-com:vml" Requires="v">
-                <p:oleObj spid="_x0000_s85194" name="Equation" r:id="rId9" imgW="914400" imgH="393700" progId="Equation.DSMT4">
+                <p:oleObj spid="_x0000_s85203" name="Equation" r:id="rId9" imgW="914400" imgH="393700" progId="Equation.DSMT4">
                   <p:embed/>
                 </p:oleObj>
               </mc:Choice>
@@ -33764,7 +33804,7 @@
           <a:graphicData uri="http://schemas.openxmlformats.org/presentationml/2006/ole">
             <mc:AlternateContent xmlns:mc="http://schemas.openxmlformats.org/markup-compatibility/2006">
               <mc:Choice xmlns:v="urn:schemas-microsoft-com:vml" Requires="v">
-                <p:oleObj spid="_x0000_s85195" name="Equation" r:id="rId11" imgW="1473200" imgH="482600" progId="Equation.3">
+                <p:oleObj spid="_x0000_s85204" name="Equation" r:id="rId11" imgW="1473200" imgH="482600" progId="Equation.3">
                   <p:embed/>
                 </p:oleObj>
               </mc:Choice>
@@ -34538,7 +34578,7 @@
           <a:graphicData uri="http://schemas.openxmlformats.org/presentationml/2006/ole">
             <mc:AlternateContent xmlns:mc="http://schemas.openxmlformats.org/markup-compatibility/2006">
               <mc:Choice xmlns:v="urn:schemas-microsoft-com:vml" Requires="v">
-                <p:oleObj spid="_x0000_s1049" name="Equation" r:id="rId5" imgW="1320800" imgH="393700" progId="Equation.DSMT4">
+                <p:oleObj spid="_x0000_s1052" name="Equation" r:id="rId5" imgW="1320800" imgH="393700" progId="Equation.DSMT4">
                   <p:embed/>
                 </p:oleObj>
               </mc:Choice>

</xml_diff>